<commit_message>
add second slide to presentation
</commit_message>
<xml_diff>
--- a/studying_files/Транслятор.pptx
+++ b/studying_files/Транслятор.pptx
@@ -6,6 +6,7 @@
   </p:sldMasterIdLst>
   <p:sldIdLst>
     <p:sldId id="256" r:id="rId3"/>
+    <p:sldId id="257" r:id="rId4"/>
   </p:sldIdLst>
   <p:sldSz cx="10080625" cy="5670550"/>
   <p:notesSz cx="7559675" cy="10691812"/>
@@ -1461,25 +1462,7 @@
               <a:rPr b="0" lang="ru-RU" sz="3200" spc="-1" strike="noStrike">
                 <a:latin typeface="Arial"/>
               </a:rPr>
-              <a:t>Для правки </a:t>
-            </a:r>
-            <a:r>
-              <a:rPr b="0" lang="ru-RU" sz="3200" spc="-1" strike="noStrike">
-                <a:latin typeface="Arial"/>
-              </a:rPr>
-              <a:t>структуры </a:t>
-            </a:r>
-            <a:r>
-              <a:rPr b="0" lang="ru-RU" sz="3200" spc="-1" strike="noStrike">
-                <a:latin typeface="Arial"/>
-              </a:rPr>
-              <a:t>щёлкните </a:t>
-            </a:r>
-            <a:r>
-              <a:rPr b="0" lang="ru-RU" sz="3200" spc="-1" strike="noStrike">
-                <a:latin typeface="Arial"/>
-              </a:rPr>
-              <a:t>мышью</a:t>
+              <a:t>Для правки структуры щёлкните мышью</a:t>
             </a:r>
             <a:endParaRPr b="0" lang="ru-RU" sz="3200" spc="-1" strike="noStrike">
               <a:latin typeface="Arial"/>
@@ -1501,13 +1484,7 @@
               <a:rPr b="0" lang="ru-RU" sz="2800" spc="-1" strike="noStrike">
                 <a:latin typeface="Arial"/>
               </a:rPr>
-              <a:t>Второй уровень </a:t>
-            </a:r>
-            <a:r>
-              <a:rPr b="0" lang="ru-RU" sz="2800" spc="-1" strike="noStrike">
-                <a:latin typeface="Arial"/>
-              </a:rPr>
-              <a:t>структуры</a:t>
+              <a:t>Второй уровень структуры</a:t>
             </a:r>
             <a:endParaRPr b="0" lang="ru-RU" sz="2800" spc="-1" strike="noStrike">
               <a:latin typeface="Arial"/>
@@ -1529,13 +1506,7 @@
               <a:rPr b="0" lang="ru-RU" sz="2400" spc="-1" strike="noStrike">
                 <a:latin typeface="Arial"/>
               </a:rPr>
-              <a:t>Третий уровень </a:t>
-            </a:r>
-            <a:r>
-              <a:rPr b="0" lang="ru-RU" sz="2400" spc="-1" strike="noStrike">
-                <a:latin typeface="Arial"/>
-              </a:rPr>
-              <a:t>структуры</a:t>
+              <a:t>Третий уровень структуры</a:t>
             </a:r>
             <a:endParaRPr b="0" lang="ru-RU" sz="2400" spc="-1" strike="noStrike">
               <a:latin typeface="Arial"/>
@@ -1557,19 +1528,7 @@
               <a:rPr b="0" lang="ru-RU" sz="2000" spc="-1" strike="noStrike">
                 <a:latin typeface="Arial"/>
               </a:rPr>
-              <a:t>Четвёртый </a:t>
-            </a:r>
-            <a:r>
-              <a:rPr b="0" lang="ru-RU" sz="2000" spc="-1" strike="noStrike">
-                <a:latin typeface="Arial"/>
-              </a:rPr>
-              <a:t>уровень </a:t>
-            </a:r>
-            <a:r>
-              <a:rPr b="0" lang="ru-RU" sz="2000" spc="-1" strike="noStrike">
-                <a:latin typeface="Arial"/>
-              </a:rPr>
-              <a:t>структуры</a:t>
+              <a:t>Четвёртый уровень структуры</a:t>
             </a:r>
             <a:endParaRPr b="0" lang="ru-RU" sz="2000" spc="-1" strike="noStrike">
               <a:latin typeface="Arial"/>
@@ -1591,19 +1550,7 @@
               <a:rPr b="0" lang="ru-RU" sz="2000" spc="-1" strike="noStrike">
                 <a:latin typeface="Arial"/>
               </a:rPr>
-              <a:t>Пятый </a:t>
-            </a:r>
-            <a:r>
-              <a:rPr b="0" lang="ru-RU" sz="2000" spc="-1" strike="noStrike">
-                <a:latin typeface="Arial"/>
-              </a:rPr>
-              <a:t>уровень </a:t>
-            </a:r>
-            <a:r>
-              <a:rPr b="0" lang="ru-RU" sz="2000" spc="-1" strike="noStrike">
-                <a:latin typeface="Arial"/>
-              </a:rPr>
-              <a:t>структуры</a:t>
+              <a:t>Пятый уровень структуры</a:t>
             </a:r>
             <a:endParaRPr b="0" lang="ru-RU" sz="2000" spc="-1" strike="noStrike">
               <a:latin typeface="Arial"/>
@@ -1625,25 +1572,7 @@
               <a:rPr b="0" lang="ru-RU" sz="2000" spc="-1" strike="noStrike">
                 <a:latin typeface="Arial"/>
               </a:rPr>
-              <a:t>Шестой </a:t>
-            </a:r>
-            <a:r>
-              <a:rPr b="0" lang="ru-RU" sz="2000" spc="-1" strike="noStrike">
-                <a:latin typeface="Arial"/>
-              </a:rPr>
-              <a:t>уровень </a:t>
-            </a:r>
-            <a:r>
-              <a:rPr b="0" lang="ru-RU" sz="2000" spc="-1" strike="noStrike">
-                <a:latin typeface="Arial"/>
-              </a:rPr>
-              <a:t>структу</a:t>
-            </a:r>
-            <a:r>
-              <a:rPr b="0" lang="ru-RU" sz="2000" spc="-1" strike="noStrike">
-                <a:latin typeface="Arial"/>
-              </a:rPr>
-              <a:t>ры</a:t>
+              <a:t>Шестой уровень структуры</a:t>
             </a:r>
             <a:endParaRPr b="0" lang="ru-RU" sz="2000" spc="-1" strike="noStrike">
               <a:latin typeface="Arial"/>
@@ -1665,49 +1594,7 @@
               <a:rPr b="0" lang="ru-RU" sz="2000" spc="-1" strike="noStrike">
                 <a:latin typeface="Arial"/>
               </a:rPr>
-              <a:t>Сед</a:t>
-            </a:r>
-            <a:r>
-              <a:rPr b="0" lang="ru-RU" sz="2000" spc="-1" strike="noStrike">
-                <a:latin typeface="Arial"/>
-              </a:rPr>
-              <a:t>ьмо</a:t>
-            </a:r>
-            <a:r>
-              <a:rPr b="0" lang="ru-RU" sz="2000" spc="-1" strike="noStrike">
-                <a:latin typeface="Arial"/>
-              </a:rPr>
-              <a:t>й </a:t>
-            </a:r>
-            <a:r>
-              <a:rPr b="0" lang="ru-RU" sz="2000" spc="-1" strike="noStrike">
-                <a:latin typeface="Arial"/>
-              </a:rPr>
-              <a:t>уров</a:t>
-            </a:r>
-            <a:r>
-              <a:rPr b="0" lang="ru-RU" sz="2000" spc="-1" strike="noStrike">
-                <a:latin typeface="Arial"/>
-              </a:rPr>
-              <a:t>ень </a:t>
-            </a:r>
-            <a:r>
-              <a:rPr b="0" lang="ru-RU" sz="2000" spc="-1" strike="noStrike">
-                <a:latin typeface="Arial"/>
-              </a:rPr>
-              <a:t>стру</a:t>
-            </a:r>
-            <a:r>
-              <a:rPr b="0" lang="ru-RU" sz="2000" spc="-1" strike="noStrike">
-                <a:latin typeface="Arial"/>
-              </a:rPr>
-              <a:t>ктур</a:t>
-            </a:r>
-            <a:r>
-              <a:rPr b="0" lang="ru-RU" sz="2000" spc="-1" strike="noStrike">
-                <a:latin typeface="Arial"/>
-              </a:rPr>
-              <a:t>ы</a:t>
+              <a:t>Седьмой уровень структуры</a:t>
             </a:r>
             <a:endParaRPr b="0" lang="ru-RU" sz="2000" spc="-1" strike="noStrike">
               <a:latin typeface="Arial"/>
@@ -1813,7 +1700,7 @@
           </a:bodyPr>
           <a:p>
             <a:pPr algn="r"/>
-            <a:fld id="{7EF957D3-D8B6-4227-8464-82142B0E0669}" type="slidenum">
+            <a:fld id="{E79DC01B-4B88-439D-9AB7-A4688BDACDA4}" type="slidenum">
               <a:rPr b="0" lang="ru-RU" sz="1400" spc="-1" strike="noStrike">
                 <a:latin typeface="Times New Roman"/>
               </a:rPr>
@@ -1870,7 +1757,7 @@
         </p:nvSpPr>
         <p:spPr>
           <a:xfrm>
-            <a:off x="504000" y="485640"/>
+            <a:off x="576000" y="61560"/>
             <a:ext cx="9071640" cy="946440"/>
           </a:xfrm>
           <a:prstGeom prst="rect">
@@ -1891,7 +1778,7 @@
               <a:rPr b="0" lang="ru-RU" sz="3200" spc="-1" strike="noStrike">
                 <a:latin typeface="Arial"/>
               </a:rPr>
-              <a:t>Транслятор из программного языка Java в программный язык C#</a:t>
+              <a:t>Транслятор</a:t>
             </a:r>
             <a:endParaRPr b="0" lang="ru-RU" sz="3200" spc="-1" strike="noStrike">
               <a:latin typeface="Arial"/>
@@ -1911,7 +1798,7 @@
         </p:blipFill>
         <p:spPr>
           <a:xfrm>
-            <a:off x="936360" y="1440000"/>
+            <a:off x="936000" y="1368000"/>
             <a:ext cx="1727640" cy="3168000"/>
           </a:xfrm>
           <a:prstGeom prst="rect">
@@ -1934,7 +1821,7 @@
         </p:blipFill>
         <p:spPr>
           <a:xfrm>
-            <a:off x="7632000" y="1440000"/>
+            <a:off x="7416000" y="2016000"/>
             <a:ext cx="2304000" cy="2304000"/>
           </a:xfrm>
           <a:prstGeom prst="rect">
@@ -1957,8 +1844,136 @@
         </p:blipFill>
         <p:spPr>
           <a:xfrm>
-            <a:off x="3031920" y="1512000"/>
+            <a:off x="3240000" y="727920"/>
             <a:ext cx="4096080" cy="4096080"/>
+          </a:xfrm>
+          <a:prstGeom prst="rect">
+            <a:avLst/>
+          </a:prstGeom>
+          <a:ln>
+            <a:noFill/>
+          </a:ln>
+        </p:spPr>
+      </p:pic>
+      <p:sp>
+        <p:nvSpPr>
+          <p:cNvPr id="45" name="TextShape 2"/>
+          <p:cNvSpPr txBox="1"/>
+          <p:nvPr/>
+        </p:nvSpPr>
+        <p:spPr>
+          <a:xfrm>
+            <a:off x="-72000" y="4662720"/>
+            <a:ext cx="3456000" cy="802440"/>
+          </a:xfrm>
+          <a:prstGeom prst="rect">
+            <a:avLst/>
+          </a:prstGeom>
+          <a:noFill/>
+          <a:ln>
+            <a:noFill/>
+          </a:ln>
+        </p:spPr>
+        <p:txBody>
+          <a:bodyPr lIns="0" rIns="0" tIns="0" bIns="0" anchor="ctr">
+            <a:noAutofit/>
+          </a:bodyPr>
+          <a:p>
+            <a:pPr algn="ctr"/>
+            <a:r>
+              <a:rPr b="0" lang="ru-RU" sz="2000" spc="-1" strike="noStrike">
+                <a:latin typeface="Arial"/>
+              </a:rPr>
+              <a:t>(Программный язык Джава)</a:t>
+            </a:r>
+            <a:endParaRPr b="0" lang="ru-RU" sz="2000" spc="-1" strike="noStrike">
+              <a:latin typeface="Arial"/>
+            </a:endParaRPr>
+          </a:p>
+        </p:txBody>
+      </p:sp>
+      <p:sp>
+        <p:nvSpPr>
+          <p:cNvPr id="46" name="TextShape 3"/>
+          <p:cNvSpPr txBox="1"/>
+          <p:nvPr/>
+        </p:nvSpPr>
+        <p:spPr>
+          <a:xfrm>
+            <a:off x="6192000" y="4608000"/>
+            <a:ext cx="3816000" cy="802440"/>
+          </a:xfrm>
+          <a:prstGeom prst="rect">
+            <a:avLst/>
+          </a:prstGeom>
+          <a:noFill/>
+          <a:ln>
+            <a:noFill/>
+          </a:ln>
+        </p:spPr>
+        <p:txBody>
+          <a:bodyPr lIns="0" rIns="0" tIns="0" bIns="0" anchor="ctr">
+            <a:noAutofit/>
+          </a:bodyPr>
+          <a:p>
+            <a:pPr algn="ctr"/>
+            <a:r>
+              <a:rPr b="0" lang="ru-RU" sz="2000" spc="-1" strike="noStrike">
+                <a:latin typeface="Arial"/>
+              </a:rPr>
+              <a:t>(Программный язык Cи Шарп)</a:t>
+            </a:r>
+            <a:endParaRPr b="0" lang="ru-RU" sz="2000" spc="-1" strike="noStrike">
+              <a:latin typeface="Arial"/>
+            </a:endParaRPr>
+          </a:p>
+        </p:txBody>
+      </p:sp>
+    </p:spTree>
+  </p:cSld>
+  <mc:AlternateContent>
+    <mc:Choice Requires="p14">
+      <p:transition spd="slow" p14:dur="2000"/>
+    </mc:Choice>
+    <mc:Fallback>
+      <p:transition spd="slow"/>
+    </mc:Fallback>
+  </mc:AlternateContent>
+</p:sld>
+</file>
+
+<file path=ppt/slides/slide2.xml><?xml version="1.0" encoding="utf-8"?>
+<p:sld xmlns:a="http://schemas.openxmlformats.org/drawingml/2006/main" xmlns:p="http://schemas.openxmlformats.org/presentationml/2006/main" xmlns:r="http://schemas.openxmlformats.org/officeDocument/2006/relationships" xmlns:p14="http://schemas.microsoft.com/office/powerpoint/2010/main" xmlns:p15="http://schemas.microsoft.com/office/powerpoint/2012/main" xmlns:mc="http://schemas.openxmlformats.org/markup-compatibility/2006">
+  <p:cSld>
+    <p:spTree>
+      <p:nvGrpSpPr>
+        <p:cNvPr id="1" name=""/>
+        <p:cNvGrpSpPr/>
+        <p:nvPr/>
+      </p:nvGrpSpPr>
+      <p:grpSpPr>
+        <a:xfrm>
+          <a:off x="0" y="0"/>
+          <a:ext cx="0" cy="0"/>
+          <a:chOff x="0" y="0"/>
+          <a:chExt cx="0" cy="0"/>
+        </a:xfrm>
+      </p:grpSpPr>
+      <p:pic>
+        <p:nvPicPr>
+          <p:cNvPr id="47" name="" descr=""/>
+          <p:cNvPicPr/>
+          <p:nvPr/>
+        </p:nvPicPr>
+        <p:blipFill>
+          <a:blip r:embed="rId1"/>
+          <a:srcRect l="26081" t="27538" r="49630" b="40707"/>
+          <a:stretch/>
+        </p:blipFill>
+        <p:spPr>
+          <a:xfrm>
+            <a:off x="2044440" y="576000"/>
+            <a:ext cx="5875560" cy="4320000"/>
           </a:xfrm>
           <a:prstGeom prst="rect">
             <a:avLst/>

</xml_diff>